<commit_message>
Added updated Presentation and DEMO.
</commit_message>
<xml_diff>
--- a/ASU-QUB_Challenge_Presentation.pptx
+++ b/ASU-QUB_Challenge_Presentation.pptx
@@ -13553,7 +13553,7 @@
                                 </p:cTn>
                               </p:par>
                               <p:par>
-                                <p:cTn id="14" presetID="2" presetClass="entr" presetSubtype="2" fill="hold" nodeType="withEffect">
+                                <p:cTn id="14" presetID="2" presetClass="entr" presetSubtype="8" fill="hold" grpId="0" nodeType="withEffect">
                                   <p:stCondLst>
                                     <p:cond delay="0"/>
                                   </p:stCondLst>
@@ -13561,6 +13561,79 @@
                                     <p:set>
                                       <p:cBhvr>
                                         <p:cTn id="15" dur="1" fill="hold">
+                                          <p:stCondLst>
+                                            <p:cond delay="0"/>
+                                          </p:stCondLst>
+                                        </p:cTn>
+                                        <p:tgtEl>
+                                          <p:spTgt spid="6"/>
+                                        </p:tgtEl>
+                                        <p:attrNameLst>
+                                          <p:attrName>style.visibility</p:attrName>
+                                        </p:attrNameLst>
+                                      </p:cBhvr>
+                                      <p:to>
+                                        <p:strVal val="visible"/>
+                                      </p:to>
+                                    </p:set>
+                                    <p:anim calcmode="lin" valueType="num">
+                                      <p:cBhvr additive="base">
+                                        <p:cTn id="16" dur="500" fill="hold"/>
+                                        <p:tgtEl>
+                                          <p:spTgt spid="6"/>
+                                        </p:tgtEl>
+                                        <p:attrNameLst>
+                                          <p:attrName>ppt_x</p:attrName>
+                                        </p:attrNameLst>
+                                      </p:cBhvr>
+                                      <p:tavLst>
+                                        <p:tav tm="0">
+                                          <p:val>
+                                            <p:strVal val="0-#ppt_w/2"/>
+                                          </p:val>
+                                        </p:tav>
+                                        <p:tav tm="100000">
+                                          <p:val>
+                                            <p:strVal val="#ppt_x"/>
+                                          </p:val>
+                                        </p:tav>
+                                      </p:tavLst>
+                                    </p:anim>
+                                    <p:anim calcmode="lin" valueType="num">
+                                      <p:cBhvr additive="base">
+                                        <p:cTn id="17" dur="500" fill="hold"/>
+                                        <p:tgtEl>
+                                          <p:spTgt spid="6"/>
+                                        </p:tgtEl>
+                                        <p:attrNameLst>
+                                          <p:attrName>ppt_y</p:attrName>
+                                        </p:attrNameLst>
+                                      </p:cBhvr>
+                                      <p:tavLst>
+                                        <p:tav tm="0">
+                                          <p:val>
+                                            <p:strVal val="#ppt_y"/>
+                                          </p:val>
+                                        </p:tav>
+                                        <p:tav tm="100000">
+                                          <p:val>
+                                            <p:strVal val="#ppt_y"/>
+                                          </p:val>
+                                        </p:tav>
+                                      </p:tavLst>
+                                    </p:anim>
+                                  </p:childTnLst>
+                                </p:cTn>
+                              </p:par>
+                              <p:par>
+                                <p:cTn id="18" presetID="2" presetClass="entr" presetSubtype="2" fill="hold" nodeType="withEffect">
+                                  <p:stCondLst>
+                                    <p:cond delay="0"/>
+                                  </p:stCondLst>
+                                  <p:childTnLst>
+                                    <p:set>
+                                      <p:cBhvr>
+                                        <p:cTn id="19" dur="1" fill="hold">
                                           <p:stCondLst>
                                             <p:cond delay="0"/>
                                           </p:stCondLst>
@@ -13578,7 +13651,7 @@
                                     </p:set>
                                     <p:anim calcmode="lin" valueType="num">
                                       <p:cBhvr additive="base">
-                                        <p:cTn id="16" dur="500" fill="hold"/>
+                                        <p:cTn id="20" dur="500" fill="hold"/>
                                         <p:tgtEl>
                                           <p:spTgt spid="137"/>
                                         </p:tgtEl>
@@ -13601,7 +13674,7 @@
                                     </p:anim>
                                     <p:anim calcmode="lin" valueType="num">
                                       <p:cBhvr additive="base">
-                                        <p:cTn id="17" dur="500" fill="hold"/>
+                                        <p:cTn id="21" dur="500" fill="hold"/>
                                         <p:tgtEl>
                                           <p:spTgt spid="137"/>
                                         </p:tgtEl>
@@ -13632,26 +13705,26 @@
                     </p:cTn>
                   </p:par>
                   <p:par>
-                    <p:cTn id="18" fill="hold">
+                    <p:cTn id="22" fill="hold">
                       <p:stCondLst>
                         <p:cond delay="indefinite"/>
                       </p:stCondLst>
                       <p:childTnLst>
                         <p:par>
-                          <p:cTn id="19" fill="hold">
+                          <p:cTn id="23" fill="hold">
                             <p:stCondLst>
                               <p:cond delay="0"/>
                             </p:stCondLst>
                             <p:childTnLst>
                               <p:par>
-                                <p:cTn id="20" presetID="53" presetClass="entr" presetSubtype="16" fill="hold" grpId="0" nodeType="clickEffect">
+                                <p:cTn id="24" presetID="53" presetClass="entr" presetSubtype="16" fill="hold" grpId="0" nodeType="clickEffect">
                                   <p:stCondLst>
                                     <p:cond delay="0"/>
                                   </p:stCondLst>
                                   <p:childTnLst>
                                     <p:set>
                                       <p:cBhvr>
-                                        <p:cTn id="21" dur="1" fill="hold">
+                                        <p:cTn id="25" dur="1" fill="hold">
                                           <p:stCondLst>
                                             <p:cond delay="0"/>
                                           </p:stCondLst>
@@ -13669,7 +13742,7 @@
                                     </p:set>
                                     <p:anim calcmode="lin" valueType="num">
                                       <p:cBhvr>
-                                        <p:cTn id="22" dur="500" fill="hold"/>
+                                        <p:cTn id="26" dur="500" fill="hold"/>
                                         <p:tgtEl>
                                           <p:spTgt spid="12"/>
                                         </p:tgtEl>
@@ -13692,7 +13765,7 @@
                                     </p:anim>
                                     <p:anim calcmode="lin" valueType="num">
                                       <p:cBhvr>
-                                        <p:cTn id="23" dur="500" fill="hold"/>
+                                        <p:cTn id="27" dur="500" fill="hold"/>
                                         <p:tgtEl>
                                           <p:spTgt spid="12"/>
                                         </p:tgtEl>
@@ -13715,7 +13788,7 @@
                                     </p:anim>
                                     <p:animEffect transition="in" filter="fade">
                                       <p:cBhvr>
-                                        <p:cTn id="24" dur="500"/>
+                                        <p:cTn id="28" dur="500"/>
                                         <p:tgtEl>
                                           <p:spTgt spid="12"/>
                                         </p:tgtEl>
@@ -13731,26 +13804,26 @@
                     </p:cTn>
                   </p:par>
                   <p:par>
-                    <p:cTn id="25" fill="hold">
+                    <p:cTn id="29" fill="hold">
                       <p:stCondLst>
                         <p:cond delay="indefinite"/>
                       </p:stCondLst>
                       <p:childTnLst>
                         <p:par>
-                          <p:cTn id="26" fill="hold">
+                          <p:cTn id="30" fill="hold">
                             <p:stCondLst>
                               <p:cond delay="0"/>
                             </p:stCondLst>
                             <p:childTnLst>
                               <p:par>
-                                <p:cTn id="27" presetID="2" presetClass="exit" presetSubtype="8" fill="hold" nodeType="clickEffect">
+                                <p:cTn id="31" presetID="2" presetClass="exit" presetSubtype="8" fill="hold" nodeType="clickEffect">
                                   <p:stCondLst>
                                     <p:cond delay="0"/>
                                   </p:stCondLst>
                                   <p:childTnLst>
                                     <p:anim calcmode="lin" valueType="num">
                                       <p:cBhvr additive="base">
-                                        <p:cTn id="28" dur="500"/>
+                                        <p:cTn id="32" dur="500"/>
                                         <p:tgtEl>
                                           <p:spTgt spid="55"/>
                                         </p:tgtEl>
@@ -13773,7 +13846,7 @@
                                     </p:anim>
                                     <p:anim calcmode="lin" valueType="num">
                                       <p:cBhvr additive="base">
-                                        <p:cTn id="29" dur="500"/>
+                                        <p:cTn id="33" dur="500"/>
                                         <p:tgtEl>
                                           <p:spTgt spid="55"/>
                                         </p:tgtEl>
@@ -13796,7 +13869,7 @@
                                     </p:anim>
                                     <p:set>
                                       <p:cBhvr>
-                                        <p:cTn id="30" dur="1" fill="hold">
+                                        <p:cTn id="34" dur="1" fill="hold">
                                           <p:stCondLst>
                                             <p:cond delay="499"/>
                                           </p:stCondLst>
@@ -13819,20 +13892,20 @@
                           </p:cTn>
                         </p:par>
                         <p:par>
-                          <p:cTn id="31" fill="hold">
+                          <p:cTn id="35" fill="hold">
                             <p:stCondLst>
                               <p:cond delay="500"/>
                             </p:stCondLst>
                             <p:childTnLst>
                               <p:par>
-                                <p:cTn id="32" presetID="2" presetClass="entr" presetSubtype="8" fill="hold" nodeType="afterEffect">
+                                <p:cTn id="36" presetID="2" presetClass="entr" presetSubtype="8" fill="hold" nodeType="afterEffect">
                                   <p:stCondLst>
                                     <p:cond delay="0"/>
                                   </p:stCondLst>
                                   <p:childTnLst>
                                     <p:set>
                                       <p:cBhvr>
-                                        <p:cTn id="33" dur="1" fill="hold">
+                                        <p:cTn id="37" dur="1" fill="hold">
                                           <p:stCondLst>
                                             <p:cond delay="0"/>
                                           </p:stCondLst>
@@ -13850,7 +13923,7 @@
                                     </p:set>
                                     <p:anim calcmode="lin" valueType="num">
                                       <p:cBhvr additive="base">
-                                        <p:cTn id="34" dur="500" fill="hold"/>
+                                        <p:cTn id="38" dur="500" fill="hold"/>
                                         <p:tgtEl>
                                           <p:spTgt spid="58"/>
                                         </p:tgtEl>
@@ -13873,7 +13946,7 @@
                                     </p:anim>
                                     <p:anim calcmode="lin" valueType="num">
                                       <p:cBhvr additive="base">
-                                        <p:cTn id="35" dur="500" fill="hold"/>
+                                        <p:cTn id="39" dur="500" fill="hold"/>
                                         <p:tgtEl>
                                           <p:spTgt spid="58"/>
                                         </p:tgtEl>
@@ -13904,26 +13977,26 @@
                     </p:cTn>
                   </p:par>
                   <p:par>
-                    <p:cTn id="36" fill="hold">
+                    <p:cTn id="40" fill="hold">
                       <p:stCondLst>
                         <p:cond delay="indefinite"/>
                       </p:stCondLst>
                       <p:childTnLst>
                         <p:par>
-                          <p:cTn id="37" fill="hold">
+                          <p:cTn id="41" fill="hold">
                             <p:stCondLst>
                               <p:cond delay="0"/>
                             </p:stCondLst>
                             <p:childTnLst>
                               <p:par>
-                                <p:cTn id="38" presetID="53" presetClass="entr" presetSubtype="16" fill="hold" grpId="0" nodeType="clickEffect">
+                                <p:cTn id="42" presetID="53" presetClass="entr" presetSubtype="16" fill="hold" grpId="0" nodeType="clickEffect">
                                   <p:stCondLst>
                                     <p:cond delay="0"/>
                                   </p:stCondLst>
                                   <p:childTnLst>
                                     <p:set>
                                       <p:cBhvr>
-                                        <p:cTn id="39" dur="1" fill="hold">
+                                        <p:cTn id="43" dur="1" fill="hold">
                                           <p:stCondLst>
                                             <p:cond delay="0"/>
                                           </p:stCondLst>
@@ -13941,7 +14014,7 @@
                                     </p:set>
                                     <p:anim calcmode="lin" valueType="num">
                                       <p:cBhvr>
-                                        <p:cTn id="40" dur="500" fill="hold"/>
+                                        <p:cTn id="44" dur="500" fill="hold"/>
                                         <p:tgtEl>
                                           <p:spTgt spid="14"/>
                                         </p:tgtEl>
@@ -13964,7 +14037,7 @@
                                     </p:anim>
                                     <p:anim calcmode="lin" valueType="num">
                                       <p:cBhvr>
-                                        <p:cTn id="41" dur="500" fill="hold"/>
+                                        <p:cTn id="45" dur="500" fill="hold"/>
                                         <p:tgtEl>
                                           <p:spTgt spid="14"/>
                                         </p:tgtEl>
@@ -13987,7 +14060,7 @@
                                     </p:anim>
                                     <p:animEffect transition="in" filter="fade">
                                       <p:cBhvr>
-                                        <p:cTn id="42" dur="500"/>
+                                        <p:cTn id="46" dur="500"/>
                                         <p:tgtEl>
                                           <p:spTgt spid="14"/>
                                         </p:tgtEl>
@@ -13997,14 +14070,14 @@
                                 </p:cTn>
                               </p:par>
                               <p:par>
-                                <p:cTn id="43" presetID="53" presetClass="entr" presetSubtype="16" fill="hold" grpId="0" nodeType="withEffect">
+                                <p:cTn id="47" presetID="53" presetClass="entr" presetSubtype="16" fill="hold" grpId="0" nodeType="withEffect">
                                   <p:stCondLst>
                                     <p:cond delay="0"/>
                                   </p:stCondLst>
                                   <p:childTnLst>
                                     <p:set>
                                       <p:cBhvr>
-                                        <p:cTn id="44" dur="1" fill="hold">
+                                        <p:cTn id="48" dur="1" fill="hold">
                                           <p:stCondLst>
                                             <p:cond delay="0"/>
                                           </p:stCondLst>
@@ -14022,7 +14095,7 @@
                                     </p:set>
                                     <p:anim calcmode="lin" valueType="num">
                                       <p:cBhvr>
-                                        <p:cTn id="45" dur="500" fill="hold"/>
+                                        <p:cTn id="49" dur="500" fill="hold"/>
                                         <p:tgtEl>
                                           <p:spTgt spid="59"/>
                                         </p:tgtEl>
@@ -14045,7 +14118,7 @@
                                     </p:anim>
                                     <p:anim calcmode="lin" valueType="num">
                                       <p:cBhvr>
-                                        <p:cTn id="46" dur="500" fill="hold"/>
+                                        <p:cTn id="50" dur="500" fill="hold"/>
                                         <p:tgtEl>
                                           <p:spTgt spid="59"/>
                                         </p:tgtEl>
@@ -14068,7 +14141,7 @@
                                     </p:anim>
                                     <p:animEffect transition="in" filter="fade">
                                       <p:cBhvr>
-                                        <p:cTn id="47" dur="500"/>
+                                        <p:cTn id="51" dur="500"/>
                                         <p:tgtEl>
                                           <p:spTgt spid="59"/>
                                         </p:tgtEl>
@@ -14078,14 +14151,14 @@
                                 </p:cTn>
                               </p:par>
                               <p:par>
-                                <p:cTn id="48" presetID="53" presetClass="entr" presetSubtype="16" fill="hold" grpId="0" nodeType="withEffect">
+                                <p:cTn id="52" presetID="53" presetClass="entr" presetSubtype="16" fill="hold" grpId="0" nodeType="withEffect">
                                   <p:stCondLst>
                                     <p:cond delay="0"/>
                                   </p:stCondLst>
                                   <p:childTnLst>
                                     <p:set>
                                       <p:cBhvr>
-                                        <p:cTn id="49" dur="1" fill="hold">
+                                        <p:cTn id="53" dur="1" fill="hold">
                                           <p:stCondLst>
                                             <p:cond delay="0"/>
                                           </p:stCondLst>
@@ -14103,7 +14176,7 @@
                                     </p:set>
                                     <p:anim calcmode="lin" valueType="num">
                                       <p:cBhvr>
-                                        <p:cTn id="50" dur="500" fill="hold"/>
+                                        <p:cTn id="54" dur="500" fill="hold"/>
                                         <p:tgtEl>
                                           <p:spTgt spid="61"/>
                                         </p:tgtEl>
@@ -14126,7 +14199,7 @@
                                     </p:anim>
                                     <p:anim calcmode="lin" valueType="num">
                                       <p:cBhvr>
-                                        <p:cTn id="51" dur="500" fill="hold"/>
+                                        <p:cTn id="55" dur="500" fill="hold"/>
                                         <p:tgtEl>
                                           <p:spTgt spid="61"/>
                                         </p:tgtEl>
@@ -14149,7 +14222,7 @@
                                     </p:anim>
                                     <p:animEffect transition="in" filter="fade">
                                       <p:cBhvr>
-                                        <p:cTn id="52" dur="500"/>
+                                        <p:cTn id="56" dur="500"/>
                                         <p:tgtEl>
                                           <p:spTgt spid="61"/>
                                         </p:tgtEl>
@@ -14186,6 +14259,7 @@
       </p:par>
     </p:tnLst>
     <p:bldLst>
+      <p:bldP spid="6" grpId="0"/>
       <p:bldP spid="12" grpId="0"/>
       <p:bldP spid="14" grpId="0"/>
       <p:bldP spid="59" grpId="0"/>

</xml_diff>